<commit_message>
Changed some stuff on the features slide
I know im late
</commit_message>
<xml_diff>
--- a/Documentation/Presentation Powerpoint/Features-n-Math.pptx
+++ b/Documentation/Presentation Powerpoint/Features-n-Math.pptx
@@ -106,6 +106,11 @@
       </a:defRPr>
     </a:lvl9pPr>
   </p:defaultTextStyle>
+  <p:extLst>
+    <p:ext uri="{EFAFB233-063F-42B5-8137-9DF3F51BA10A}">
+      <p15:sldGuideLst xmlns:p15="http://schemas.microsoft.com/office/powerpoint/2012/main"/>
+    </p:ext>
+  </p:extLst>
 </p:presentation>
 </file>
 
@@ -3001,8 +3006,8 @@
         </p:nvSpPr>
         <p:spPr>
           <a:xfrm>
-            <a:off x="838200" y="1825625"/>
-            <a:ext cx="4570562" cy="4351338"/>
+            <a:off x="838199" y="1825625"/>
+            <a:ext cx="4872487" cy="4351338"/>
           </a:xfrm>
         </p:spPr>
         <p:txBody>
@@ -3013,7 +3018,17 @@
           <a:p>
             <a:r>
               <a:rPr lang="en-CA" dirty="0" smtClean="0"/>
-              <a:t>Have a user profile</a:t>
+              <a:t>Run on Android Devices (5.0 +)</a:t>
+            </a:r>
+          </a:p>
+          <a:p>
+            <a:r>
+              <a:rPr lang="en-CA" dirty="0" smtClean="0"/>
+              <a:t>Have </a:t>
+            </a:r>
+            <a:r>
+              <a:rPr lang="en-CA" dirty="0" smtClean="0"/>
+              <a:t>a user profile</a:t>
             </a:r>
           </a:p>
           <a:p>
@@ -3077,7 +3092,7 @@
         </p:nvSpPr>
         <p:spPr>
           <a:xfrm>
-            <a:off x="5633049" y="1690688"/>
+            <a:off x="5926347" y="1690688"/>
             <a:ext cx="5210355" cy="3323987"/>
           </a:xfrm>
           <a:prstGeom prst="rect">
@@ -3141,7 +3156,6 @@
               <a:rPr lang="en-CA" sz="2800" dirty="0" smtClean="0"/>
               <a:t>Be user friendly </a:t>
             </a:r>
-            <a:endParaRPr lang="en-CA" sz="2800" dirty="0" smtClean="0"/>
           </a:p>
           <a:p>
             <a:pPr lvl="1"/>
@@ -3160,12 +3174,17 @@
         </p:nvSpPr>
         <p:spPr>
           <a:xfrm>
-            <a:off x="8471140" y="3798573"/>
+            <a:off x="8531525" y="3798573"/>
             <a:ext cx="405442" cy="405441"/>
           </a:xfrm>
           <a:prstGeom prst="smileyFace">
             <a:avLst/>
           </a:prstGeom>
+          <a:ln w="19050">
+            <a:solidFill>
+              <a:schemeClr val="tx1"/>
+            </a:solidFill>
+          </a:ln>
         </p:spPr>
         <p:style>
           <a:lnRef idx="2">

</xml_diff>